<commit_message>
Figure fixes. Grammar fixes.
</commit_message>
<xml_diff>
--- a/fig/embedded_frame_to_emitter.pptx
+++ b/fig/embedded_frame_to_emitter.pptx
@@ -197,7 +197,7 @@
           <a:p>
             <a:fld id="{62C99043-9FC5-4BF5-BD58-60C9FB78D318}" type="datetimeFigureOut">
               <a:rPr lang="en-US" smtClean="0"/>
-              <a:t>10/26/2020</a:t>
+              <a:t>11/26/2020</a:t>
             </a:fld>
             <a:endParaRPr lang="en-US"/>
           </a:p>
@@ -637,7 +637,7 @@
           <a:p>
             <a:fld id="{D1F97E29-0E3F-4B99-A9ED-470A1831EC9F}" type="datetime1">
               <a:rPr lang="en-US" smtClean="0"/>
-              <a:t>10/26/2020</a:t>
+              <a:t>11/26/2020</a:t>
             </a:fld>
             <a:endParaRPr lang="en-US"/>
           </a:p>
@@ -967,7 +967,7 @@
           <a:p>
             <a:fld id="{8E01B7D2-C181-4B9D-9C09-218A8EA96AB7}" type="datetime1">
               <a:rPr lang="en-US" smtClean="0"/>
-              <a:t>10/26/2020</a:t>
+              <a:t>11/26/2020</a:t>
             </a:fld>
             <a:endParaRPr lang="en-US"/>
           </a:p>
@@ -1147,7 +1147,7 @@
           <a:p>
             <a:fld id="{2CFC8955-08FD-40DE-9323-14178C31DC71}" type="datetime1">
               <a:rPr lang="en-US" smtClean="0"/>
-              <a:t>10/26/2020</a:t>
+              <a:t>11/26/2020</a:t>
             </a:fld>
             <a:endParaRPr lang="en-US"/>
           </a:p>
@@ -1317,7 +1317,7 @@
           <a:p>
             <a:fld id="{1278314F-6144-4250-A9EF-B8208E61A2BF}" type="datetime1">
               <a:rPr lang="en-US" smtClean="0"/>
-              <a:t>10/26/2020</a:t>
+              <a:t>11/26/2020</a:t>
             </a:fld>
             <a:endParaRPr lang="en-US"/>
           </a:p>
@@ -1594,7 +1594,7 @@
           <a:p>
             <a:fld id="{C65318F9-C526-4CE6-B7BA-8FEF2D1D2323}" type="datetime1">
               <a:rPr lang="en-US" smtClean="0"/>
-              <a:t>10/26/2020</a:t>
+              <a:t>11/26/2020</a:t>
             </a:fld>
             <a:endParaRPr lang="en-US"/>
           </a:p>
@@ -1988,7 +1988,7 @@
           <a:p>
             <a:fld id="{7B66A9F1-6808-4792-8DAA-1C26F5F2B025}" type="datetime1">
               <a:rPr lang="en-US" smtClean="0"/>
-              <a:t>10/26/2020</a:t>
+              <a:t>11/26/2020</a:t>
             </a:fld>
             <a:endParaRPr lang="en-US"/>
           </a:p>
@@ -2470,7 +2470,7 @@
           <a:p>
             <a:fld id="{14EE655A-3D7C-4A80-825E-04958E92D2F1}" type="datetime1">
               <a:rPr lang="en-US" smtClean="0"/>
-              <a:t>10/26/2020</a:t>
+              <a:t>11/26/2020</a:t>
             </a:fld>
             <a:endParaRPr lang="en-US"/>
           </a:p>
@@ -2593,7 +2593,7 @@
           <a:p>
             <a:fld id="{16FF041E-7D40-4078-8338-D5DAFB1A6756}" type="datetime1">
               <a:rPr lang="en-US" smtClean="0"/>
-              <a:t>10/26/2020</a:t>
+              <a:t>11/26/2020</a:t>
             </a:fld>
             <a:endParaRPr lang="en-US"/>
           </a:p>
@@ -2688,7 +2688,7 @@
           <a:p>
             <a:fld id="{5AEA18C8-6C95-421C-9CB9-8D8F4764D53C}" type="datetime1">
               <a:rPr lang="en-US" smtClean="0"/>
-              <a:t>10/26/2020</a:t>
+              <a:t>11/26/2020</a:t>
             </a:fld>
             <a:endParaRPr lang="en-US"/>
           </a:p>
@@ -3034,7 +3034,7 @@
           <a:p>
             <a:fld id="{0E87B4D7-567C-43DA-9ABC-1D0E836AC3E9}" type="datetime1">
               <a:rPr lang="en-US" smtClean="0"/>
-              <a:t>10/26/2020</a:t>
+              <a:t>11/26/2020</a:t>
             </a:fld>
             <a:endParaRPr lang="en-US"/>
           </a:p>
@@ -3427,7 +3427,7 @@
           <a:p>
             <a:fld id="{B5290E3C-37B5-49E5-B779-123EF4A9EB69}" type="datetime1">
               <a:rPr lang="en-US" smtClean="0"/>
-              <a:t>10/26/2020</a:t>
+              <a:t>11/26/2020</a:t>
             </a:fld>
             <a:endParaRPr lang="en-US"/>
           </a:p>
@@ -3705,7 +3705,7 @@
           <a:p>
             <a:fld id="{5E063D95-9933-498C-A792-D8217AE78B36}" type="datetime1">
               <a:rPr lang="en-US" smtClean="0"/>
-              <a:t>10/26/2020</a:t>
+              <a:t>11/26/2020</a:t>
             </a:fld>
             <a:endParaRPr lang="en-US"/>
           </a:p>
@@ -4226,7 +4226,7 @@
         </p:nvSpPr>
         <p:spPr>
           <a:xfrm>
-            <a:off x="1424198" y="4043611"/>
+            <a:off x="1596992" y="3813018"/>
             <a:ext cx="3162119" cy="2095099"/>
           </a:xfrm>
           <a:prstGeom prst="rect">
@@ -4272,7 +4272,7 @@
         </p:nvSpPr>
         <p:spPr>
           <a:xfrm>
-            <a:off x="1424198" y="4043611"/>
+            <a:off x="1596992" y="3813018"/>
             <a:ext cx="397042" cy="409074"/>
           </a:xfrm>
           <a:prstGeom prst="rect">
@@ -4325,7 +4325,7 @@
         </p:nvSpPr>
         <p:spPr>
           <a:xfrm>
-            <a:off x="1817230" y="4043611"/>
+            <a:off x="1990024" y="3813018"/>
             <a:ext cx="397042" cy="409074"/>
           </a:xfrm>
           <a:prstGeom prst="rect">
@@ -4378,7 +4378,7 @@
         </p:nvSpPr>
         <p:spPr>
           <a:xfrm>
-            <a:off x="2214272" y="4043611"/>
+            <a:off x="2387066" y="3813018"/>
             <a:ext cx="397042" cy="409074"/>
           </a:xfrm>
           <a:prstGeom prst="rect">
@@ -4431,7 +4431,7 @@
         </p:nvSpPr>
         <p:spPr>
           <a:xfrm>
-            <a:off x="2611314" y="4043611"/>
+            <a:off x="2784108" y="3813018"/>
             <a:ext cx="397042" cy="409074"/>
           </a:xfrm>
           <a:prstGeom prst="rect">
@@ -4484,7 +4484,7 @@
         </p:nvSpPr>
         <p:spPr>
           <a:xfrm>
-            <a:off x="3004346" y="4043611"/>
+            <a:off x="3177140" y="3813018"/>
             <a:ext cx="397042" cy="409074"/>
           </a:xfrm>
           <a:prstGeom prst="rect">
@@ -4537,7 +4537,7 @@
         </p:nvSpPr>
         <p:spPr>
           <a:xfrm>
-            <a:off x="3401388" y="4043611"/>
+            <a:off x="3574182" y="3813018"/>
             <a:ext cx="397042" cy="409074"/>
           </a:xfrm>
           <a:prstGeom prst="rect">
@@ -4590,7 +4590,7 @@
         </p:nvSpPr>
         <p:spPr>
           <a:xfrm>
-            <a:off x="3794420" y="4043611"/>
+            <a:off x="3967214" y="3813018"/>
             <a:ext cx="397042" cy="409074"/>
           </a:xfrm>
           <a:prstGeom prst="rect">
@@ -4643,7 +4643,7 @@
         </p:nvSpPr>
         <p:spPr>
           <a:xfrm>
-            <a:off x="4188902" y="4043611"/>
+            <a:off x="4361696" y="3813018"/>
             <a:ext cx="397042" cy="409074"/>
           </a:xfrm>
           <a:prstGeom prst="rect">
@@ -4696,7 +4696,7 @@
         </p:nvSpPr>
         <p:spPr>
           <a:xfrm>
-            <a:off x="1424198" y="4452685"/>
+            <a:off x="1596992" y="4222092"/>
             <a:ext cx="397042" cy="409074"/>
           </a:xfrm>
           <a:prstGeom prst="rect">
@@ -4749,7 +4749,7 @@
         </p:nvSpPr>
         <p:spPr>
           <a:xfrm>
-            <a:off x="1817230" y="4452685"/>
+            <a:off x="1990024" y="4222092"/>
             <a:ext cx="397042" cy="409074"/>
           </a:xfrm>
           <a:prstGeom prst="rect">
@@ -4802,7 +4802,7 @@
         </p:nvSpPr>
         <p:spPr>
           <a:xfrm>
-            <a:off x="2214272" y="4452685"/>
+            <a:off x="2387066" y="4222092"/>
             <a:ext cx="397042" cy="409074"/>
           </a:xfrm>
           <a:prstGeom prst="rect">
@@ -4855,7 +4855,7 @@
         </p:nvSpPr>
         <p:spPr>
           <a:xfrm>
-            <a:off x="2611314" y="4452685"/>
+            <a:off x="2784108" y="4222092"/>
             <a:ext cx="397042" cy="409074"/>
           </a:xfrm>
           <a:prstGeom prst="rect">
@@ -4908,7 +4908,7 @@
         </p:nvSpPr>
         <p:spPr>
           <a:xfrm>
-            <a:off x="3004346" y="4452685"/>
+            <a:off x="3177140" y="4222092"/>
             <a:ext cx="397042" cy="409074"/>
           </a:xfrm>
           <a:prstGeom prst="rect">
@@ -4961,7 +4961,7 @@
         </p:nvSpPr>
         <p:spPr>
           <a:xfrm>
-            <a:off x="3401388" y="4452685"/>
+            <a:off x="3574182" y="4222092"/>
             <a:ext cx="397042" cy="409074"/>
           </a:xfrm>
           <a:prstGeom prst="rect">
@@ -5014,7 +5014,7 @@
         </p:nvSpPr>
         <p:spPr>
           <a:xfrm>
-            <a:off x="3794420" y="4452685"/>
+            <a:off x="3967214" y="4222092"/>
             <a:ext cx="397042" cy="409074"/>
           </a:xfrm>
           <a:prstGeom prst="rect">
@@ -5067,7 +5067,7 @@
         </p:nvSpPr>
         <p:spPr>
           <a:xfrm>
-            <a:off x="4188902" y="4452685"/>
+            <a:off x="4361696" y="4222092"/>
             <a:ext cx="397042" cy="409074"/>
           </a:xfrm>
           <a:prstGeom prst="rect">
@@ -5120,7 +5120,7 @@
         </p:nvSpPr>
         <p:spPr>
           <a:xfrm>
-            <a:off x="1427897" y="4861759"/>
+            <a:off x="1600691" y="4631166"/>
             <a:ext cx="397042" cy="409074"/>
           </a:xfrm>
           <a:prstGeom prst="rect">
@@ -5173,7 +5173,7 @@
         </p:nvSpPr>
         <p:spPr>
           <a:xfrm>
-            <a:off x="1820074" y="4861759"/>
+            <a:off x="1992868" y="4631166"/>
             <a:ext cx="397042" cy="409074"/>
           </a:xfrm>
           <a:prstGeom prst="rect">
@@ -5226,7 +5226,7 @@
         </p:nvSpPr>
         <p:spPr>
           <a:xfrm>
-            <a:off x="2216175" y="4861759"/>
+            <a:off x="2388969" y="4631166"/>
             <a:ext cx="396769" cy="409074"/>
           </a:xfrm>
           <a:prstGeom prst="rect">
@@ -5279,7 +5279,7 @@
         </p:nvSpPr>
         <p:spPr>
           <a:xfrm>
-            <a:off x="2612944" y="4861759"/>
+            <a:off x="2785738" y="4631166"/>
             <a:ext cx="403468" cy="409074"/>
           </a:xfrm>
           <a:prstGeom prst="rect">
@@ -5332,7 +5332,7 @@
         </p:nvSpPr>
         <p:spPr>
           <a:xfrm>
-            <a:off x="3003234" y="4861759"/>
+            <a:off x="3176028" y="4631166"/>
             <a:ext cx="397042" cy="409074"/>
           </a:xfrm>
           <a:prstGeom prst="rect">
@@ -5385,7 +5385,7 @@
         </p:nvSpPr>
         <p:spPr>
           <a:xfrm>
-            <a:off x="3400831" y="4861759"/>
+            <a:off x="3573625" y="4631166"/>
             <a:ext cx="397042" cy="409074"/>
           </a:xfrm>
           <a:prstGeom prst="rect">
@@ -5438,7 +5438,7 @@
         </p:nvSpPr>
         <p:spPr>
           <a:xfrm>
-            <a:off x="3793863" y="4861759"/>
+            <a:off x="3966657" y="4631166"/>
             <a:ext cx="397042" cy="409074"/>
           </a:xfrm>
           <a:prstGeom prst="rect">
@@ -5491,7 +5491,7 @@
         </p:nvSpPr>
         <p:spPr>
           <a:xfrm>
-            <a:off x="4188902" y="4861759"/>
+            <a:off x="4361696" y="4631166"/>
             <a:ext cx="397042" cy="409074"/>
           </a:xfrm>
           <a:prstGeom prst="rect">
@@ -5544,7 +5544,7 @@
         </p:nvSpPr>
         <p:spPr>
           <a:xfrm>
-            <a:off x="1371600" y="3694150"/>
+            <a:off x="1544394" y="3463557"/>
             <a:ext cx="3674035" cy="369332"/>
           </a:xfrm>
           <a:prstGeom prst="rect">
@@ -5574,13 +5574,15 @@
               </a:ext>
             </a:extLst>
           </p:cNvPr>
-          <p:cNvSpPr/>
+          <p:cNvSpPr>
+            <a:spLocks noChangeAspect="1"/>
+          </p:cNvSpPr>
           <p:nvPr/>
         </p:nvSpPr>
         <p:spPr>
           <a:xfrm>
-            <a:off x="6787923" y="3878816"/>
-            <a:ext cx="3670969" cy="2553182"/>
+            <a:off x="6347152" y="2946872"/>
+            <a:ext cx="5506454" cy="3829773"/>
           </a:xfrm>
           <a:prstGeom prst="rect">
             <a:avLst/>
@@ -5625,7 +5627,7 @@
         </p:nvSpPr>
         <p:spPr>
           <a:xfrm>
-            <a:off x="5092494" y="4657222"/>
+            <a:off x="5006972" y="4487301"/>
             <a:ext cx="1126603" cy="717631"/>
           </a:xfrm>
           <a:prstGeom prst="rightArrow">
@@ -5671,8 +5673,8 @@
         </p:nvSpPr>
         <p:spPr>
           <a:xfrm>
-            <a:off x="7907430" y="3482482"/>
-            <a:ext cx="1442977" cy="369332"/>
+            <a:off x="8094087" y="2538506"/>
+            <a:ext cx="2236370" cy="369332"/>
           </a:xfrm>
           <a:prstGeom prst="rect">
             <a:avLst/>
@@ -5687,7 +5689,7 @@
           <a:p>
             <a:r>
               <a:rPr lang="en-US" dirty="0"/>
-              <a:t>Array Emitter</a:t>
+              <a:t>Large Array Emitter</a:t>
             </a:r>
           </a:p>
         </p:txBody>
@@ -5706,7 +5708,7 @@
         </p:nvSpPr>
         <p:spPr>
           <a:xfrm>
-            <a:off x="8782878" y="4165042"/>
+            <a:off x="9575656" y="3798034"/>
             <a:ext cx="1346522" cy="307777"/>
           </a:xfrm>
           <a:prstGeom prst="rect">
@@ -5807,7 +5809,7 @@
         </p:blipFill>
         <p:spPr bwMode="auto">
           <a:xfrm>
-            <a:off x="7383179" y="4657222"/>
+            <a:off x="6947316" y="4427821"/>
             <a:ext cx="513149" cy="433938"/>
           </a:xfrm>
           <a:prstGeom prst="rect">
@@ -5854,7 +5856,7 @@
         </p:blipFill>
         <p:spPr bwMode="auto">
           <a:xfrm>
-            <a:off x="9010096" y="5726026"/>
+            <a:off x="10330457" y="5830028"/>
             <a:ext cx="648978" cy="548800"/>
           </a:xfrm>
           <a:prstGeom prst="rect">
@@ -5886,7 +5888,7 @@
         </p:nvSpPr>
         <p:spPr>
           <a:xfrm>
-            <a:off x="7173842" y="4380223"/>
+            <a:off x="6737979" y="4150822"/>
             <a:ext cx="931822" cy="276999"/>
           </a:xfrm>
           <a:prstGeom prst="rect">
@@ -5964,7 +5966,7 @@
         </p:nvSpPr>
         <p:spPr>
           <a:xfrm>
-            <a:off x="8868674" y="5505448"/>
+            <a:off x="10189035" y="5609450"/>
             <a:ext cx="931822" cy="276999"/>
           </a:xfrm>
           <a:prstGeom prst="rect">
@@ -6018,7 +6020,7 @@
         </p:blipFill>
         <p:spPr bwMode="auto">
           <a:xfrm>
-            <a:off x="8331450" y="4312643"/>
+            <a:off x="9124228" y="3945635"/>
             <a:ext cx="1679115" cy="872207"/>
           </a:xfrm>
           <a:prstGeom prst="rect">

</xml_diff>